<commit_message>
20-22 PPT 작성 및 복습
</commit_message>
<xml_diff>
--- a/MYSQL PPT/20. Clustered vs Non-Clustered.pptx
+++ b/MYSQL PPT/20. Clustered vs Non-Clustered.pptx
@@ -12,9 +12,6 @@
     <p:sldId id="267" r:id="rId6"/>
     <p:sldId id="268" r:id="rId7"/>
     <p:sldId id="269" r:id="rId8"/>
-    <p:sldId id="270" r:id="rId9"/>
-    <p:sldId id="271" r:id="rId10"/>
-    <p:sldId id="272" r:id="rId11"/>
   </p:sldIdLst>
   <p:sldSz cx="12192000" cy="6858000"/>
   <p:notesSz cx="6858000" cy="9144000"/>
@@ -268,7 +265,7 @@
           <a:p>
             <a:fld id="{62D5EA94-9BE6-4E76-BDC6-A92BD1999B7B}" type="datetimeFigureOut">
               <a:rPr lang="ko-KR" altLang="en-US" smtClean="0"/>
-              <a:t>2025-04-28</a:t>
+              <a:t>2025-04-29</a:t>
             </a:fld>
             <a:endParaRPr lang="ko-KR" altLang="en-US"/>
           </a:p>
@@ -466,7 +463,7 @@
           <a:p>
             <a:fld id="{62D5EA94-9BE6-4E76-BDC6-A92BD1999B7B}" type="datetimeFigureOut">
               <a:rPr lang="ko-KR" altLang="en-US" smtClean="0"/>
-              <a:t>2025-04-28</a:t>
+              <a:t>2025-04-29</a:t>
             </a:fld>
             <a:endParaRPr lang="ko-KR" altLang="en-US"/>
           </a:p>
@@ -674,7 +671,7 @@
           <a:p>
             <a:fld id="{62D5EA94-9BE6-4E76-BDC6-A92BD1999B7B}" type="datetimeFigureOut">
               <a:rPr lang="ko-KR" altLang="en-US" smtClean="0"/>
-              <a:t>2025-04-28</a:t>
+              <a:t>2025-04-29</a:t>
             </a:fld>
             <a:endParaRPr lang="ko-KR" altLang="en-US"/>
           </a:p>
@@ -872,7 +869,7 @@
           <a:p>
             <a:fld id="{62D5EA94-9BE6-4E76-BDC6-A92BD1999B7B}" type="datetimeFigureOut">
               <a:rPr lang="ko-KR" altLang="en-US" smtClean="0"/>
-              <a:t>2025-04-28</a:t>
+              <a:t>2025-04-29</a:t>
             </a:fld>
             <a:endParaRPr lang="ko-KR" altLang="en-US"/>
           </a:p>
@@ -1147,7 +1144,7 @@
           <a:p>
             <a:fld id="{62D5EA94-9BE6-4E76-BDC6-A92BD1999B7B}" type="datetimeFigureOut">
               <a:rPr lang="ko-KR" altLang="en-US" smtClean="0"/>
-              <a:t>2025-04-28</a:t>
+              <a:t>2025-04-29</a:t>
             </a:fld>
             <a:endParaRPr lang="ko-KR" altLang="en-US"/>
           </a:p>
@@ -1412,7 +1409,7 @@
           <a:p>
             <a:fld id="{62D5EA94-9BE6-4E76-BDC6-A92BD1999B7B}" type="datetimeFigureOut">
               <a:rPr lang="ko-KR" altLang="en-US" smtClean="0"/>
-              <a:t>2025-04-28</a:t>
+              <a:t>2025-04-29</a:t>
             </a:fld>
             <a:endParaRPr lang="ko-KR" altLang="en-US"/>
           </a:p>
@@ -1824,7 +1821,7 @@
           <a:p>
             <a:fld id="{62D5EA94-9BE6-4E76-BDC6-A92BD1999B7B}" type="datetimeFigureOut">
               <a:rPr lang="ko-KR" altLang="en-US" smtClean="0"/>
-              <a:t>2025-04-28</a:t>
+              <a:t>2025-04-29</a:t>
             </a:fld>
             <a:endParaRPr lang="ko-KR" altLang="en-US"/>
           </a:p>
@@ -1965,7 +1962,7 @@
           <a:p>
             <a:fld id="{62D5EA94-9BE6-4E76-BDC6-A92BD1999B7B}" type="datetimeFigureOut">
               <a:rPr lang="ko-KR" altLang="en-US" smtClean="0"/>
-              <a:t>2025-04-28</a:t>
+              <a:t>2025-04-29</a:t>
             </a:fld>
             <a:endParaRPr lang="ko-KR" altLang="en-US"/>
           </a:p>
@@ -2078,7 +2075,7 @@
           <a:p>
             <a:fld id="{62D5EA94-9BE6-4E76-BDC6-A92BD1999B7B}" type="datetimeFigureOut">
               <a:rPr lang="ko-KR" altLang="en-US" smtClean="0"/>
-              <a:t>2025-04-28</a:t>
+              <a:t>2025-04-29</a:t>
             </a:fld>
             <a:endParaRPr lang="ko-KR" altLang="en-US"/>
           </a:p>
@@ -2389,7 +2386,7 @@
           <a:p>
             <a:fld id="{62D5EA94-9BE6-4E76-BDC6-A92BD1999B7B}" type="datetimeFigureOut">
               <a:rPr lang="ko-KR" altLang="en-US" smtClean="0"/>
-              <a:t>2025-04-28</a:t>
+              <a:t>2025-04-29</a:t>
             </a:fld>
             <a:endParaRPr lang="ko-KR" altLang="en-US"/>
           </a:p>
@@ -2677,7 +2674,7 @@
           <a:p>
             <a:fld id="{62D5EA94-9BE6-4E76-BDC6-A92BD1999B7B}" type="datetimeFigureOut">
               <a:rPr lang="ko-KR" altLang="en-US" smtClean="0"/>
-              <a:t>2025-04-28</a:t>
+              <a:t>2025-04-29</a:t>
             </a:fld>
             <a:endParaRPr lang="ko-KR" altLang="en-US"/>
           </a:p>
@@ -2918,7 +2915,7 @@
           <a:p>
             <a:fld id="{62D5EA94-9BE6-4E76-BDC6-A92BD1999B7B}" type="datetimeFigureOut">
               <a:rPr lang="ko-KR" altLang="en-US" smtClean="0"/>
-              <a:t>2025-04-28</a:t>
+              <a:t>2025-04-29</a:t>
             </a:fld>
             <a:endParaRPr lang="ko-KR" altLang="en-US"/>
           </a:p>
@@ -3341,46 +3338,40 @@
           <a:chExt cx="0" cy="0"/>
         </a:xfrm>
       </p:grpSpPr>
+      <p:pic>
+        <p:nvPicPr>
+          <p:cNvPr id="5" name="그림 4">
+            <a:extLst>
+              <a:ext uri="{FF2B5EF4-FFF2-40B4-BE49-F238E27FC236}">
+                <a16:creationId xmlns:a16="http://schemas.microsoft.com/office/drawing/2014/main" id="{AC441A47-7E94-6A02-3212-D16815BBD299}"/>
+              </a:ext>
+            </a:extLst>
+          </p:cNvPr>
+          <p:cNvPicPr>
+            <a:picLocks noChangeAspect="1"/>
+          </p:cNvPicPr>
+          <p:nvPr/>
+        </p:nvPicPr>
+        <p:blipFill>
+          <a:blip r:embed="rId2"/>
+          <a:stretch>
+            <a:fillRect/>
+          </a:stretch>
+        </p:blipFill>
+        <p:spPr>
+          <a:xfrm>
+            <a:off x="2524125" y="1852612"/>
+            <a:ext cx="7143750" cy="3152775"/>
+          </a:xfrm>
+          <a:prstGeom prst="rect">
+            <a:avLst/>
+          </a:prstGeom>
+        </p:spPr>
+      </p:pic>
     </p:spTree>
     <p:extLst>
       <p:ext uri="{BB962C8B-B14F-4D97-AF65-F5344CB8AC3E}">
         <p14:creationId xmlns:p14="http://schemas.microsoft.com/office/powerpoint/2010/main" val="2097808463"/>
-      </p:ext>
-    </p:extLst>
-  </p:cSld>
-  <p:clrMapOvr>
-    <a:masterClrMapping/>
-  </p:clrMapOvr>
-</p:sld>
-</file>
-
-<file path=ppt/slides/slide10.xml><?xml version="1.0" encoding="utf-8"?>
-<p:sld xmlns:a="http://schemas.openxmlformats.org/drawingml/2006/main" xmlns:r="http://schemas.openxmlformats.org/officeDocument/2006/relationships" xmlns:p="http://schemas.openxmlformats.org/presentationml/2006/main">
-  <p:cSld>
-    <p:spTree>
-      <p:nvGrpSpPr>
-        <p:cNvPr id="1" name="">
-          <a:extLst>
-            <a:ext uri="{FF2B5EF4-FFF2-40B4-BE49-F238E27FC236}">
-              <a16:creationId xmlns:a16="http://schemas.microsoft.com/office/drawing/2014/main" id="{8EAB2436-D92D-95A0-A30E-89094792D935}"/>
-            </a:ext>
-          </a:extLst>
-        </p:cNvPr>
-        <p:cNvGrpSpPr/>
-        <p:nvPr/>
-      </p:nvGrpSpPr>
-      <p:grpSpPr>
-        <a:xfrm>
-          <a:off x="0" y="0"/>
-          <a:ext cx="0" cy="0"/>
-          <a:chOff x="0" y="0"/>
-          <a:chExt cx="0" cy="0"/>
-        </a:xfrm>
-      </p:grpSpPr>
-    </p:spTree>
-    <p:extLst>
-      <p:ext uri="{BB962C8B-B14F-4D97-AF65-F5344CB8AC3E}">
-        <p14:creationId xmlns:p14="http://schemas.microsoft.com/office/powerpoint/2010/main" val="986821805"/>
       </p:ext>
     </p:extLst>
   </p:cSld>
@@ -3413,6 +3404,36 @@
           <a:chExt cx="0" cy="0"/>
         </a:xfrm>
       </p:grpSpPr>
+      <p:pic>
+        <p:nvPicPr>
+          <p:cNvPr id="3" name="그림 2">
+            <a:extLst>
+              <a:ext uri="{FF2B5EF4-FFF2-40B4-BE49-F238E27FC236}">
+                <a16:creationId xmlns:a16="http://schemas.microsoft.com/office/drawing/2014/main" id="{B82A2821-F2C0-C002-97FC-2B9D5DAFA6F6}"/>
+              </a:ext>
+            </a:extLst>
+          </p:cNvPr>
+          <p:cNvPicPr>
+            <a:picLocks noChangeAspect="1"/>
+          </p:cNvPicPr>
+          <p:nvPr/>
+        </p:nvPicPr>
+        <p:blipFill>
+          <a:blip r:embed="rId2"/>
+          <a:stretch>
+            <a:fillRect/>
+          </a:stretch>
+        </p:blipFill>
+        <p:spPr>
+          <a:xfrm>
+            <a:off x="2509837" y="1352550"/>
+            <a:ext cx="7172325" cy="4152900"/>
+          </a:xfrm>
+          <a:prstGeom prst="rect">
+            <a:avLst/>
+          </a:prstGeom>
+        </p:spPr>
+      </p:pic>
     </p:spTree>
     <p:extLst>
       <p:ext uri="{BB962C8B-B14F-4D97-AF65-F5344CB8AC3E}">
@@ -3449,6 +3470,36 @@
           <a:chExt cx="0" cy="0"/>
         </a:xfrm>
       </p:grpSpPr>
+      <p:pic>
+        <p:nvPicPr>
+          <p:cNvPr id="5" name="그림 4">
+            <a:extLst>
+              <a:ext uri="{FF2B5EF4-FFF2-40B4-BE49-F238E27FC236}">
+                <a16:creationId xmlns:a16="http://schemas.microsoft.com/office/drawing/2014/main" id="{5CB85E4A-CACE-E6E6-D3C1-DF7B28AE5848}"/>
+              </a:ext>
+            </a:extLst>
+          </p:cNvPr>
+          <p:cNvPicPr>
+            <a:picLocks noChangeAspect="1"/>
+          </p:cNvPicPr>
+          <p:nvPr/>
+        </p:nvPicPr>
+        <p:blipFill>
+          <a:blip r:embed="rId2"/>
+          <a:stretch>
+            <a:fillRect/>
+          </a:stretch>
+        </p:blipFill>
+        <p:spPr>
+          <a:xfrm>
+            <a:off x="2586037" y="481012"/>
+            <a:ext cx="7019925" cy="5895975"/>
+          </a:xfrm>
+          <a:prstGeom prst="rect">
+            <a:avLst/>
+          </a:prstGeom>
+        </p:spPr>
+      </p:pic>
     </p:spTree>
     <p:extLst>
       <p:ext uri="{BB962C8B-B14F-4D97-AF65-F5344CB8AC3E}">
@@ -3485,6 +3536,36 @@
           <a:chExt cx="0" cy="0"/>
         </a:xfrm>
       </p:grpSpPr>
+      <p:pic>
+        <p:nvPicPr>
+          <p:cNvPr id="5" name="그림 4">
+            <a:extLst>
+              <a:ext uri="{FF2B5EF4-FFF2-40B4-BE49-F238E27FC236}">
+                <a16:creationId xmlns:a16="http://schemas.microsoft.com/office/drawing/2014/main" id="{5969DB64-DFF6-E80E-B855-EFA949766DB2}"/>
+              </a:ext>
+            </a:extLst>
+          </p:cNvPr>
+          <p:cNvPicPr>
+            <a:picLocks noChangeAspect="1"/>
+          </p:cNvPicPr>
+          <p:nvPr/>
+        </p:nvPicPr>
+        <p:blipFill>
+          <a:blip r:embed="rId2"/>
+          <a:stretch>
+            <a:fillRect/>
+          </a:stretch>
+        </p:blipFill>
+        <p:spPr>
+          <a:xfrm>
+            <a:off x="2643187" y="1042987"/>
+            <a:ext cx="6905625" cy="4772025"/>
+          </a:xfrm>
+          <a:prstGeom prst="rect">
+            <a:avLst/>
+          </a:prstGeom>
+        </p:spPr>
+      </p:pic>
     </p:spTree>
     <p:extLst>
       <p:ext uri="{BB962C8B-B14F-4D97-AF65-F5344CB8AC3E}">
@@ -3521,6 +3602,36 @@
           <a:chExt cx="0" cy="0"/>
         </a:xfrm>
       </p:grpSpPr>
+      <p:pic>
+        <p:nvPicPr>
+          <p:cNvPr id="7" name="그림 6">
+            <a:extLst>
+              <a:ext uri="{FF2B5EF4-FFF2-40B4-BE49-F238E27FC236}">
+                <a16:creationId xmlns:a16="http://schemas.microsoft.com/office/drawing/2014/main" id="{718C7494-D93C-B5BC-FA3A-779A5347E12B}"/>
+              </a:ext>
+            </a:extLst>
+          </p:cNvPr>
+          <p:cNvPicPr>
+            <a:picLocks noChangeAspect="1"/>
+          </p:cNvPicPr>
+          <p:nvPr/>
+        </p:nvPicPr>
+        <p:blipFill>
+          <a:blip r:embed="rId2"/>
+          <a:stretch>
+            <a:fillRect/>
+          </a:stretch>
+        </p:blipFill>
+        <p:spPr>
+          <a:xfrm>
+            <a:off x="2442652" y="404390"/>
+            <a:ext cx="7306695" cy="6049219"/>
+          </a:xfrm>
+          <a:prstGeom prst="rect">
+            <a:avLst/>
+          </a:prstGeom>
+        </p:spPr>
+      </p:pic>
     </p:spTree>
     <p:extLst>
       <p:ext uri="{BB962C8B-B14F-4D97-AF65-F5344CB8AC3E}">
@@ -3557,6 +3668,36 @@
           <a:chExt cx="0" cy="0"/>
         </a:xfrm>
       </p:grpSpPr>
+      <p:pic>
+        <p:nvPicPr>
+          <p:cNvPr id="3" name="그림 2">
+            <a:extLst>
+              <a:ext uri="{FF2B5EF4-FFF2-40B4-BE49-F238E27FC236}">
+                <a16:creationId xmlns:a16="http://schemas.microsoft.com/office/drawing/2014/main" id="{9F9275A5-C18A-E888-1DE0-79B4E412B380}"/>
+              </a:ext>
+            </a:extLst>
+          </p:cNvPr>
+          <p:cNvPicPr>
+            <a:picLocks noChangeAspect="1"/>
+          </p:cNvPicPr>
+          <p:nvPr/>
+        </p:nvPicPr>
+        <p:blipFill>
+          <a:blip r:embed="rId2"/>
+          <a:stretch>
+            <a:fillRect/>
+          </a:stretch>
+        </p:blipFill>
+        <p:spPr>
+          <a:xfrm>
+            <a:off x="2463062" y="0"/>
+            <a:ext cx="7265875" cy="6858000"/>
+          </a:xfrm>
+          <a:prstGeom prst="rect">
+            <a:avLst/>
+          </a:prstGeom>
+        </p:spPr>
+      </p:pic>
     </p:spTree>
     <p:extLst>
       <p:ext uri="{BB962C8B-B14F-4D97-AF65-F5344CB8AC3E}">
@@ -3593,82 +3734,40 @@
           <a:chExt cx="0" cy="0"/>
         </a:xfrm>
       </p:grpSpPr>
+      <p:pic>
+        <p:nvPicPr>
+          <p:cNvPr id="3" name="그림 2">
+            <a:extLst>
+              <a:ext uri="{FF2B5EF4-FFF2-40B4-BE49-F238E27FC236}">
+                <a16:creationId xmlns:a16="http://schemas.microsoft.com/office/drawing/2014/main" id="{48C54109-8A06-0155-9BEF-8A76EBA89477}"/>
+              </a:ext>
+            </a:extLst>
+          </p:cNvPr>
+          <p:cNvPicPr>
+            <a:picLocks noChangeAspect="1"/>
+          </p:cNvPicPr>
+          <p:nvPr/>
+        </p:nvPicPr>
+        <p:blipFill>
+          <a:blip r:embed="rId2"/>
+          <a:stretch>
+            <a:fillRect/>
+          </a:stretch>
+        </p:blipFill>
+        <p:spPr>
+          <a:xfrm>
+            <a:off x="2590311" y="142416"/>
+            <a:ext cx="7011378" cy="6573167"/>
+          </a:xfrm>
+          <a:prstGeom prst="rect">
+            <a:avLst/>
+          </a:prstGeom>
+        </p:spPr>
+      </p:pic>
     </p:spTree>
     <p:extLst>
       <p:ext uri="{BB962C8B-B14F-4D97-AF65-F5344CB8AC3E}">
         <p14:creationId xmlns:p14="http://schemas.microsoft.com/office/powerpoint/2010/main" val="4045017533"/>
-      </p:ext>
-    </p:extLst>
-  </p:cSld>
-  <p:clrMapOvr>
-    <a:masterClrMapping/>
-  </p:clrMapOvr>
-</p:sld>
-</file>
-
-<file path=ppt/slides/slide8.xml><?xml version="1.0" encoding="utf-8"?>
-<p:sld xmlns:a="http://schemas.openxmlformats.org/drawingml/2006/main" xmlns:r="http://schemas.openxmlformats.org/officeDocument/2006/relationships" xmlns:p="http://schemas.openxmlformats.org/presentationml/2006/main">
-  <p:cSld>
-    <p:spTree>
-      <p:nvGrpSpPr>
-        <p:cNvPr id="1" name="">
-          <a:extLst>
-            <a:ext uri="{FF2B5EF4-FFF2-40B4-BE49-F238E27FC236}">
-              <a16:creationId xmlns:a16="http://schemas.microsoft.com/office/drawing/2014/main" id="{C2D0C50F-04C7-B398-194C-EF8ED67C8783}"/>
-            </a:ext>
-          </a:extLst>
-        </p:cNvPr>
-        <p:cNvGrpSpPr/>
-        <p:nvPr/>
-      </p:nvGrpSpPr>
-      <p:grpSpPr>
-        <a:xfrm>
-          <a:off x="0" y="0"/>
-          <a:ext cx="0" cy="0"/>
-          <a:chOff x="0" y="0"/>
-          <a:chExt cx="0" cy="0"/>
-        </a:xfrm>
-      </p:grpSpPr>
-    </p:spTree>
-    <p:extLst>
-      <p:ext uri="{BB962C8B-B14F-4D97-AF65-F5344CB8AC3E}">
-        <p14:creationId xmlns:p14="http://schemas.microsoft.com/office/powerpoint/2010/main" val="684061742"/>
-      </p:ext>
-    </p:extLst>
-  </p:cSld>
-  <p:clrMapOvr>
-    <a:masterClrMapping/>
-  </p:clrMapOvr>
-</p:sld>
-</file>
-
-<file path=ppt/slides/slide9.xml><?xml version="1.0" encoding="utf-8"?>
-<p:sld xmlns:a="http://schemas.openxmlformats.org/drawingml/2006/main" xmlns:r="http://schemas.openxmlformats.org/officeDocument/2006/relationships" xmlns:p="http://schemas.openxmlformats.org/presentationml/2006/main">
-  <p:cSld>
-    <p:spTree>
-      <p:nvGrpSpPr>
-        <p:cNvPr id="1" name="">
-          <a:extLst>
-            <a:ext uri="{FF2B5EF4-FFF2-40B4-BE49-F238E27FC236}">
-              <a16:creationId xmlns:a16="http://schemas.microsoft.com/office/drawing/2014/main" id="{46518BD9-4DDB-B3AA-86FC-9B9B1F82ADEB}"/>
-            </a:ext>
-          </a:extLst>
-        </p:cNvPr>
-        <p:cNvGrpSpPr/>
-        <p:nvPr/>
-      </p:nvGrpSpPr>
-      <p:grpSpPr>
-        <a:xfrm>
-          <a:off x="0" y="0"/>
-          <a:ext cx="0" cy="0"/>
-          <a:chOff x="0" y="0"/>
-          <a:chExt cx="0" cy="0"/>
-        </a:xfrm>
-      </p:grpSpPr>
-    </p:spTree>
-    <p:extLst>
-      <p:ext uri="{BB962C8B-B14F-4D97-AF65-F5344CB8AC3E}">
-        <p14:creationId xmlns:p14="http://schemas.microsoft.com/office/powerpoint/2010/main" val="1058920747"/>
       </p:ext>
     </p:extLst>
   </p:cSld>

</xml_diff>